<commit_message>
Update 'Modeling structures' subsection
</commit_message>
<xml_diff>
--- a/diagrams/uml/classDiagrams/enumerations/playerTurn.pptx
+++ b/diagrams/uml/classDiagrams/enumerations/playerTurn.pptx
@@ -161,7 +161,7 @@
           <a:lstStyle/>
           <a:p>
             <a:r>
-              <a:rPr lang="en-US" smtClean="0"/>
+              <a:rPr lang="en-US"/>
               <a:t>Click to edit Master title style</a:t>
             </a:r>
             <a:endParaRPr lang="en-SG"/>
@@ -280,7 +280,7 @@
           </a:lstStyle>
           <a:p>
             <a:r>
-              <a:rPr lang="en-US" smtClean="0"/>
+              <a:rPr lang="en-US"/>
               <a:t>Click to edit Master subtitle style</a:t>
             </a:r>
             <a:endParaRPr lang="en-SG"/>
@@ -304,7 +304,7 @@
           <a:p>
             <a:fld id="{A0F86979-30DA-49EE-A740-32EBA6D2B7DE}" type="datetimeFigureOut">
               <a:rPr lang="en-SG" smtClean="0"/>
-              <a:t>31/8/2017</a:t>
+              <a:t>29/11/2020</a:t>
             </a:fld>
             <a:endParaRPr lang="en-SG"/>
           </a:p>
@@ -398,7 +398,7 @@
           <a:lstStyle/>
           <a:p>
             <a:r>
-              <a:rPr lang="en-US" smtClean="0"/>
+              <a:rPr lang="en-US"/>
               <a:t>Click to edit Master title style</a:t>
             </a:r>
             <a:endParaRPr lang="en-SG"/>
@@ -422,35 +422,35 @@
           <a:p>
             <a:pPr lvl="0"/>
             <a:r>
-              <a:rPr lang="en-US" smtClean="0"/>
+              <a:rPr lang="en-US"/>
               <a:t>Click to edit Master text styles</a:t>
             </a:r>
           </a:p>
           <a:p>
             <a:pPr lvl="1"/>
             <a:r>
-              <a:rPr lang="en-US" smtClean="0"/>
+              <a:rPr lang="en-US"/>
               <a:t>Second level</a:t>
             </a:r>
           </a:p>
           <a:p>
             <a:pPr lvl="2"/>
             <a:r>
-              <a:rPr lang="en-US" smtClean="0"/>
+              <a:rPr lang="en-US"/>
               <a:t>Third level</a:t>
             </a:r>
           </a:p>
           <a:p>
             <a:pPr lvl="3"/>
             <a:r>
-              <a:rPr lang="en-US" smtClean="0"/>
+              <a:rPr lang="en-US"/>
               <a:t>Fourth level</a:t>
             </a:r>
           </a:p>
           <a:p>
             <a:pPr lvl="4"/>
             <a:r>
-              <a:rPr lang="en-US" smtClean="0"/>
+              <a:rPr lang="en-US"/>
               <a:t>Fifth level</a:t>
             </a:r>
             <a:endParaRPr lang="en-SG"/>
@@ -474,7 +474,7 @@
           <a:p>
             <a:fld id="{A0F86979-30DA-49EE-A740-32EBA6D2B7DE}" type="datetimeFigureOut">
               <a:rPr lang="en-SG" smtClean="0"/>
-              <a:t>31/8/2017</a:t>
+              <a:t>29/11/2020</a:t>
             </a:fld>
             <a:endParaRPr lang="en-SG"/>
           </a:p>
@@ -573,7 +573,7 @@
           <a:lstStyle/>
           <a:p>
             <a:r>
-              <a:rPr lang="en-US" smtClean="0"/>
+              <a:rPr lang="en-US"/>
               <a:t>Click to edit Master title style</a:t>
             </a:r>
             <a:endParaRPr lang="en-SG"/>
@@ -602,35 +602,35 @@
           <a:p>
             <a:pPr lvl="0"/>
             <a:r>
-              <a:rPr lang="en-US" smtClean="0"/>
+              <a:rPr lang="en-US"/>
               <a:t>Click to edit Master text styles</a:t>
             </a:r>
           </a:p>
           <a:p>
             <a:pPr lvl="1"/>
             <a:r>
-              <a:rPr lang="en-US" smtClean="0"/>
+              <a:rPr lang="en-US"/>
               <a:t>Second level</a:t>
             </a:r>
           </a:p>
           <a:p>
             <a:pPr lvl="2"/>
             <a:r>
-              <a:rPr lang="en-US" smtClean="0"/>
+              <a:rPr lang="en-US"/>
               <a:t>Third level</a:t>
             </a:r>
           </a:p>
           <a:p>
             <a:pPr lvl="3"/>
             <a:r>
-              <a:rPr lang="en-US" smtClean="0"/>
+              <a:rPr lang="en-US"/>
               <a:t>Fourth level</a:t>
             </a:r>
           </a:p>
           <a:p>
             <a:pPr lvl="4"/>
             <a:r>
-              <a:rPr lang="en-US" smtClean="0"/>
+              <a:rPr lang="en-US"/>
               <a:t>Fifth level</a:t>
             </a:r>
             <a:endParaRPr lang="en-SG"/>
@@ -654,7 +654,7 @@
           <a:p>
             <a:fld id="{A0F86979-30DA-49EE-A740-32EBA6D2B7DE}" type="datetimeFigureOut">
               <a:rPr lang="en-SG" smtClean="0"/>
-              <a:t>31/8/2017</a:t>
+              <a:t>29/11/2020</a:t>
             </a:fld>
             <a:endParaRPr lang="en-SG"/>
           </a:p>
@@ -748,7 +748,7 @@
           <a:lstStyle/>
           <a:p>
             <a:r>
-              <a:rPr lang="en-US" smtClean="0"/>
+              <a:rPr lang="en-US"/>
               <a:t>Click to edit Master title style</a:t>
             </a:r>
             <a:endParaRPr lang="en-SG"/>
@@ -772,35 +772,35 @@
           <a:p>
             <a:pPr lvl="0"/>
             <a:r>
-              <a:rPr lang="en-US" smtClean="0"/>
+              <a:rPr lang="en-US"/>
               <a:t>Click to edit Master text styles</a:t>
             </a:r>
           </a:p>
           <a:p>
             <a:pPr lvl="1"/>
             <a:r>
-              <a:rPr lang="en-US" smtClean="0"/>
+              <a:rPr lang="en-US"/>
               <a:t>Second level</a:t>
             </a:r>
           </a:p>
           <a:p>
             <a:pPr lvl="2"/>
             <a:r>
-              <a:rPr lang="en-US" smtClean="0"/>
+              <a:rPr lang="en-US"/>
               <a:t>Third level</a:t>
             </a:r>
           </a:p>
           <a:p>
             <a:pPr lvl="3"/>
             <a:r>
-              <a:rPr lang="en-US" smtClean="0"/>
+              <a:rPr lang="en-US"/>
               <a:t>Fourth level</a:t>
             </a:r>
           </a:p>
           <a:p>
             <a:pPr lvl="4"/>
             <a:r>
-              <a:rPr lang="en-US" smtClean="0"/>
+              <a:rPr lang="en-US"/>
               <a:t>Fifth level</a:t>
             </a:r>
             <a:endParaRPr lang="en-SG"/>
@@ -824,7 +824,7 @@
           <a:p>
             <a:fld id="{A0F86979-30DA-49EE-A740-32EBA6D2B7DE}" type="datetimeFigureOut">
               <a:rPr lang="en-SG" smtClean="0"/>
-              <a:t>31/8/2017</a:t>
+              <a:t>29/11/2020</a:t>
             </a:fld>
             <a:endParaRPr lang="en-SG"/>
           </a:p>
@@ -927,7 +927,7 @@
           </a:lstStyle>
           <a:p>
             <a:r>
-              <a:rPr lang="en-US" smtClean="0"/>
+              <a:rPr lang="en-US"/>
               <a:t>Click to edit Master title style</a:t>
             </a:r>
             <a:endParaRPr lang="en-SG"/>
@@ -1047,7 +1047,7 @@
           <a:p>
             <a:pPr lvl="0"/>
             <a:r>
-              <a:rPr lang="en-US" smtClean="0"/>
+              <a:rPr lang="en-US"/>
               <a:t>Click to edit Master text styles</a:t>
             </a:r>
           </a:p>
@@ -1070,7 +1070,7 @@
           <a:p>
             <a:fld id="{A0F86979-30DA-49EE-A740-32EBA6D2B7DE}" type="datetimeFigureOut">
               <a:rPr lang="en-SG" smtClean="0"/>
-              <a:t>31/8/2017</a:t>
+              <a:t>29/11/2020</a:t>
             </a:fld>
             <a:endParaRPr lang="en-SG"/>
           </a:p>
@@ -1164,7 +1164,7 @@
           <a:lstStyle/>
           <a:p>
             <a:r>
-              <a:rPr lang="en-US" smtClean="0"/>
+              <a:rPr lang="en-US"/>
               <a:t>Click to edit Master title style</a:t>
             </a:r>
             <a:endParaRPr lang="en-SG"/>
@@ -1221,35 +1221,35 @@
           <a:p>
             <a:pPr lvl="0"/>
             <a:r>
-              <a:rPr lang="en-US" smtClean="0"/>
+              <a:rPr lang="en-US"/>
               <a:t>Click to edit Master text styles</a:t>
             </a:r>
           </a:p>
           <a:p>
             <a:pPr lvl="1"/>
             <a:r>
-              <a:rPr lang="en-US" smtClean="0"/>
+              <a:rPr lang="en-US"/>
               <a:t>Second level</a:t>
             </a:r>
           </a:p>
           <a:p>
             <a:pPr lvl="2"/>
             <a:r>
-              <a:rPr lang="en-US" smtClean="0"/>
+              <a:rPr lang="en-US"/>
               <a:t>Third level</a:t>
             </a:r>
           </a:p>
           <a:p>
             <a:pPr lvl="3"/>
             <a:r>
-              <a:rPr lang="en-US" smtClean="0"/>
+              <a:rPr lang="en-US"/>
               <a:t>Fourth level</a:t>
             </a:r>
           </a:p>
           <a:p>
             <a:pPr lvl="4"/>
             <a:r>
-              <a:rPr lang="en-US" smtClean="0"/>
+              <a:rPr lang="en-US"/>
               <a:t>Fifth level</a:t>
             </a:r>
             <a:endParaRPr lang="en-SG"/>
@@ -1306,35 +1306,35 @@
           <a:p>
             <a:pPr lvl="0"/>
             <a:r>
-              <a:rPr lang="en-US" smtClean="0"/>
+              <a:rPr lang="en-US"/>
               <a:t>Click to edit Master text styles</a:t>
             </a:r>
           </a:p>
           <a:p>
             <a:pPr lvl="1"/>
             <a:r>
-              <a:rPr lang="en-US" smtClean="0"/>
+              <a:rPr lang="en-US"/>
               <a:t>Second level</a:t>
             </a:r>
           </a:p>
           <a:p>
             <a:pPr lvl="2"/>
             <a:r>
-              <a:rPr lang="en-US" smtClean="0"/>
+              <a:rPr lang="en-US"/>
               <a:t>Third level</a:t>
             </a:r>
           </a:p>
           <a:p>
             <a:pPr lvl="3"/>
             <a:r>
-              <a:rPr lang="en-US" smtClean="0"/>
+              <a:rPr lang="en-US"/>
               <a:t>Fourth level</a:t>
             </a:r>
           </a:p>
           <a:p>
             <a:pPr lvl="4"/>
             <a:r>
-              <a:rPr lang="en-US" smtClean="0"/>
+              <a:rPr lang="en-US"/>
               <a:t>Fifth level</a:t>
             </a:r>
             <a:endParaRPr lang="en-SG"/>
@@ -1358,7 +1358,7 @@
           <a:p>
             <a:fld id="{A0F86979-30DA-49EE-A740-32EBA6D2B7DE}" type="datetimeFigureOut">
               <a:rPr lang="en-SG" smtClean="0"/>
-              <a:t>31/8/2017</a:t>
+              <a:t>29/11/2020</a:t>
             </a:fld>
             <a:endParaRPr lang="en-SG"/>
           </a:p>
@@ -1456,7 +1456,7 @@
           </a:lstStyle>
           <a:p>
             <a:r>
-              <a:rPr lang="en-US" smtClean="0"/>
+              <a:rPr lang="en-US"/>
               <a:t>Click to edit Master title style</a:t>
             </a:r>
             <a:endParaRPr lang="en-SG"/>
@@ -1522,7 +1522,7 @@
           <a:p>
             <a:pPr lvl="0"/>
             <a:r>
-              <a:rPr lang="en-US" smtClean="0"/>
+              <a:rPr lang="en-US"/>
               <a:t>Click to edit Master text styles</a:t>
             </a:r>
           </a:p>
@@ -1578,35 +1578,35 @@
           <a:p>
             <a:pPr lvl="0"/>
             <a:r>
-              <a:rPr lang="en-US" smtClean="0"/>
+              <a:rPr lang="en-US"/>
               <a:t>Click to edit Master text styles</a:t>
             </a:r>
           </a:p>
           <a:p>
             <a:pPr lvl="1"/>
             <a:r>
-              <a:rPr lang="en-US" smtClean="0"/>
+              <a:rPr lang="en-US"/>
               <a:t>Second level</a:t>
             </a:r>
           </a:p>
           <a:p>
             <a:pPr lvl="2"/>
             <a:r>
-              <a:rPr lang="en-US" smtClean="0"/>
+              <a:rPr lang="en-US"/>
               <a:t>Third level</a:t>
             </a:r>
           </a:p>
           <a:p>
             <a:pPr lvl="3"/>
             <a:r>
-              <a:rPr lang="en-US" smtClean="0"/>
+              <a:rPr lang="en-US"/>
               <a:t>Fourth level</a:t>
             </a:r>
           </a:p>
           <a:p>
             <a:pPr lvl="4"/>
             <a:r>
-              <a:rPr lang="en-US" smtClean="0"/>
+              <a:rPr lang="en-US"/>
               <a:t>Fifth level</a:t>
             </a:r>
             <a:endParaRPr lang="en-SG"/>
@@ -1672,7 +1672,7 @@
           <a:p>
             <a:pPr lvl="0"/>
             <a:r>
-              <a:rPr lang="en-US" smtClean="0"/>
+              <a:rPr lang="en-US"/>
               <a:t>Click to edit Master text styles</a:t>
             </a:r>
           </a:p>
@@ -1728,35 +1728,35 @@
           <a:p>
             <a:pPr lvl="0"/>
             <a:r>
-              <a:rPr lang="en-US" smtClean="0"/>
+              <a:rPr lang="en-US"/>
               <a:t>Click to edit Master text styles</a:t>
             </a:r>
           </a:p>
           <a:p>
             <a:pPr lvl="1"/>
             <a:r>
-              <a:rPr lang="en-US" smtClean="0"/>
+              <a:rPr lang="en-US"/>
               <a:t>Second level</a:t>
             </a:r>
           </a:p>
           <a:p>
             <a:pPr lvl="2"/>
             <a:r>
-              <a:rPr lang="en-US" smtClean="0"/>
+              <a:rPr lang="en-US"/>
               <a:t>Third level</a:t>
             </a:r>
           </a:p>
           <a:p>
             <a:pPr lvl="3"/>
             <a:r>
-              <a:rPr lang="en-US" smtClean="0"/>
+              <a:rPr lang="en-US"/>
               <a:t>Fourth level</a:t>
             </a:r>
           </a:p>
           <a:p>
             <a:pPr lvl="4"/>
             <a:r>
-              <a:rPr lang="en-US" smtClean="0"/>
+              <a:rPr lang="en-US"/>
               <a:t>Fifth level</a:t>
             </a:r>
             <a:endParaRPr lang="en-SG"/>
@@ -1780,7 +1780,7 @@
           <a:p>
             <a:fld id="{A0F86979-30DA-49EE-A740-32EBA6D2B7DE}" type="datetimeFigureOut">
               <a:rPr lang="en-SG" smtClean="0"/>
-              <a:t>31/8/2017</a:t>
+              <a:t>29/11/2020</a:t>
             </a:fld>
             <a:endParaRPr lang="en-SG"/>
           </a:p>
@@ -1874,7 +1874,7 @@
           <a:lstStyle/>
           <a:p>
             <a:r>
-              <a:rPr lang="en-US" smtClean="0"/>
+              <a:rPr lang="en-US"/>
               <a:t>Click to edit Master title style</a:t>
             </a:r>
             <a:endParaRPr lang="en-SG"/>
@@ -1898,7 +1898,7 @@
           <a:p>
             <a:fld id="{A0F86979-30DA-49EE-A740-32EBA6D2B7DE}" type="datetimeFigureOut">
               <a:rPr lang="en-SG" smtClean="0"/>
-              <a:t>31/8/2017</a:t>
+              <a:t>29/11/2020</a:t>
             </a:fld>
             <a:endParaRPr lang="en-SG"/>
           </a:p>
@@ -1993,7 +1993,7 @@
           <a:p>
             <a:fld id="{A0F86979-30DA-49EE-A740-32EBA6D2B7DE}" type="datetimeFigureOut">
               <a:rPr lang="en-SG" smtClean="0"/>
-              <a:t>31/8/2017</a:t>
+              <a:t>29/11/2020</a:t>
             </a:fld>
             <a:endParaRPr lang="en-SG"/>
           </a:p>
@@ -2096,7 +2096,7 @@
           </a:lstStyle>
           <a:p>
             <a:r>
-              <a:rPr lang="en-US" smtClean="0"/>
+              <a:rPr lang="en-US"/>
               <a:t>Click to edit Master title style</a:t>
             </a:r>
             <a:endParaRPr lang="en-SG"/>
@@ -2153,35 +2153,35 @@
           <a:p>
             <a:pPr lvl="0"/>
             <a:r>
-              <a:rPr lang="en-US" smtClean="0"/>
+              <a:rPr lang="en-US"/>
               <a:t>Click to edit Master text styles</a:t>
             </a:r>
           </a:p>
           <a:p>
             <a:pPr lvl="1"/>
             <a:r>
-              <a:rPr lang="en-US" smtClean="0"/>
+              <a:rPr lang="en-US"/>
               <a:t>Second level</a:t>
             </a:r>
           </a:p>
           <a:p>
             <a:pPr lvl="2"/>
             <a:r>
-              <a:rPr lang="en-US" smtClean="0"/>
+              <a:rPr lang="en-US"/>
               <a:t>Third level</a:t>
             </a:r>
           </a:p>
           <a:p>
             <a:pPr lvl="3"/>
             <a:r>
-              <a:rPr lang="en-US" smtClean="0"/>
+              <a:rPr lang="en-US"/>
               <a:t>Fourth level</a:t>
             </a:r>
           </a:p>
           <a:p>
             <a:pPr lvl="4"/>
             <a:r>
-              <a:rPr lang="en-US" smtClean="0"/>
+              <a:rPr lang="en-US"/>
               <a:t>Fifth level</a:t>
             </a:r>
             <a:endParaRPr lang="en-SG"/>
@@ -2247,7 +2247,7 @@
           <a:p>
             <a:pPr lvl="0"/>
             <a:r>
-              <a:rPr lang="en-US" smtClean="0"/>
+              <a:rPr lang="en-US"/>
               <a:t>Click to edit Master text styles</a:t>
             </a:r>
           </a:p>
@@ -2270,7 +2270,7 @@
           <a:p>
             <a:fld id="{A0F86979-30DA-49EE-A740-32EBA6D2B7DE}" type="datetimeFigureOut">
               <a:rPr lang="en-SG" smtClean="0"/>
-              <a:t>31/8/2017</a:t>
+              <a:t>29/11/2020</a:t>
             </a:fld>
             <a:endParaRPr lang="en-SG"/>
           </a:p>
@@ -2373,7 +2373,7 @@
           </a:lstStyle>
           <a:p>
             <a:r>
-              <a:rPr lang="en-US" smtClean="0"/>
+              <a:rPr lang="en-US"/>
               <a:t>Click to edit Master title style</a:t>
             </a:r>
             <a:endParaRPr lang="en-SG"/>
@@ -2500,7 +2500,7 @@
           <a:p>
             <a:pPr lvl="0"/>
             <a:r>
-              <a:rPr lang="en-US" smtClean="0"/>
+              <a:rPr lang="en-US"/>
               <a:t>Click to edit Master text styles</a:t>
             </a:r>
           </a:p>
@@ -2523,7 +2523,7 @@
           <a:p>
             <a:fld id="{A0F86979-30DA-49EE-A740-32EBA6D2B7DE}" type="datetimeFigureOut">
               <a:rPr lang="en-SG" smtClean="0"/>
-              <a:t>31/8/2017</a:t>
+              <a:t>29/11/2020</a:t>
             </a:fld>
             <a:endParaRPr lang="en-SG"/>
           </a:p>
@@ -2632,7 +2632,7 @@
           <a:lstStyle/>
           <a:p>
             <a:r>
-              <a:rPr lang="en-US" smtClean="0"/>
+              <a:rPr lang="en-US"/>
               <a:t>Click to edit Master title style</a:t>
             </a:r>
             <a:endParaRPr lang="en-SG"/>
@@ -2666,35 +2666,35 @@
           <a:p>
             <a:pPr lvl="0"/>
             <a:r>
-              <a:rPr lang="en-US" smtClean="0"/>
+              <a:rPr lang="en-US"/>
               <a:t>Click to edit Master text styles</a:t>
             </a:r>
           </a:p>
           <a:p>
             <a:pPr lvl="1"/>
             <a:r>
-              <a:rPr lang="en-US" smtClean="0"/>
+              <a:rPr lang="en-US"/>
               <a:t>Second level</a:t>
             </a:r>
           </a:p>
           <a:p>
             <a:pPr lvl="2"/>
             <a:r>
-              <a:rPr lang="en-US" smtClean="0"/>
+              <a:rPr lang="en-US"/>
               <a:t>Third level</a:t>
             </a:r>
           </a:p>
           <a:p>
             <a:pPr lvl="3"/>
             <a:r>
-              <a:rPr lang="en-US" smtClean="0"/>
+              <a:rPr lang="en-US"/>
               <a:t>Fourth level</a:t>
             </a:r>
           </a:p>
           <a:p>
             <a:pPr lvl="4"/>
             <a:r>
-              <a:rPr lang="en-US" smtClean="0"/>
+              <a:rPr lang="en-US"/>
               <a:t>Fifth level</a:t>
             </a:r>
             <a:endParaRPr lang="en-SG"/>
@@ -2736,7 +2736,7 @@
           <a:p>
             <a:fld id="{A0F86979-30DA-49EE-A740-32EBA6D2B7DE}" type="datetimeFigureOut">
               <a:rPr lang="en-SG" smtClean="0"/>
-              <a:t>31/8/2017</a:t>
+              <a:t>29/11/2020</a:t>
             </a:fld>
             <a:endParaRPr lang="en-SG"/>
           </a:p>
@@ -3169,7 +3169,7 @@
               <a:defRPr/>
             </a:pPr>
             <a:r>
-              <a:rPr kumimoji="0" lang="en-US" sz="1800" b="0" i="0" u="none" strike="noStrike" kern="0" cap="none" spc="0" normalizeH="0" baseline="0" noProof="0" dirty="0" smtClean="0">
+              <a:rPr kumimoji="0" lang="en-US" sz="1800" b="0" i="0" u="none" strike="noStrike" kern="0" cap="none" spc="0" normalizeH="0" baseline="0" noProof="0" dirty="0">
                 <a:ln>
                   <a:noFill/>
                 </a:ln>
@@ -3183,18 +3183,6 @@
               </a:rPr>
               <a:t>Player</a:t>
             </a:r>
-            <a:endParaRPr kumimoji="0" lang="en-US" sz="1800" b="0" i="0" u="none" strike="noStrike" kern="0" cap="none" spc="0" normalizeH="0" baseline="0" noProof="0" dirty="0">
-              <a:ln>
-                <a:noFill/>
-              </a:ln>
-              <a:solidFill>
-                <a:sysClr val="windowText" lastClr="000000"/>
-              </a:solidFill>
-              <a:effectLst/>
-              <a:uLnTx/>
-              <a:uFillTx/>
-              <a:latin typeface="Calibri" pitchFamily="34" charset="0"/>
-            </a:endParaRPr>
           </a:p>
         </p:txBody>
       </p:sp>
@@ -3252,7 +3240,7 @@
               <a:defRPr/>
             </a:pPr>
             <a:r>
-              <a:rPr kumimoji="0" lang="en-US" sz="1800" b="0" i="0" u="none" strike="noStrike" kern="0" cap="none" spc="0" normalizeH="0" baseline="0" noProof="0" dirty="0" smtClean="0">
+              <a:rPr kumimoji="0" lang="en-US" sz="1800" b="0" i="0" u="none" strike="noStrike" kern="0" cap="none" spc="0" normalizeH="0" baseline="0" noProof="0" dirty="0">
                 <a:ln>
                   <a:noFill/>
                 </a:ln>
@@ -3266,18 +3254,6 @@
               </a:rPr>
               <a:t>Die</a:t>
             </a:r>
-            <a:endParaRPr kumimoji="0" lang="en-US" sz="1800" b="0" i="0" u="none" strike="noStrike" kern="0" cap="none" spc="0" normalizeH="0" baseline="0" noProof="0" dirty="0">
-              <a:ln>
-                <a:noFill/>
-              </a:ln>
-              <a:solidFill>
-                <a:sysClr val="windowText" lastClr="000000"/>
-              </a:solidFill>
-              <a:effectLst/>
-              <a:uLnTx/>
-              <a:uFillTx/>
-              <a:latin typeface="Calibri" pitchFamily="34" charset="0"/>
-            </a:endParaRPr>
           </a:p>
         </p:txBody>
       </p:sp>
@@ -3339,7 +3315,7 @@
               <a:defRPr/>
             </a:pPr>
             <a:r>
-              <a:rPr kumimoji="0" lang="en-US" sz="1800" b="0" i="0" u="none" strike="noStrike" kern="0" cap="none" spc="0" normalizeH="0" baseline="0" noProof="0" dirty="0" smtClean="0">
+              <a:rPr kumimoji="0" lang="en-US" sz="1800" b="0" i="0" u="none" strike="noStrike" kern="0" cap="none" spc="0" normalizeH="0" baseline="0" noProof="0" dirty="0">
                 <a:ln>
                   <a:noFill/>
                 </a:ln>
@@ -3353,18 +3329,6 @@
               </a:rPr>
               <a:t>Turn</a:t>
             </a:r>
-            <a:endParaRPr kumimoji="0" lang="en-US" sz="1800" b="0" i="0" u="none" strike="noStrike" kern="0" cap="none" spc="0" normalizeH="0" baseline="0" noProof="0" dirty="0">
-              <a:ln>
-                <a:noFill/>
-              </a:ln>
-              <a:solidFill>
-                <a:sysClr val="windowText" lastClr="000000"/>
-              </a:solidFill>
-              <a:effectLst/>
-              <a:uLnTx/>
-              <a:uFillTx/>
-              <a:latin typeface="Calibri" pitchFamily="34" charset="0"/>
-            </a:endParaRPr>
           </a:p>
         </p:txBody>
       </p:sp>
@@ -3480,22 +3444,31 @@
               <a:defRPr/>
             </a:pPr>
             <a:r>
-              <a:rPr lang="en-US" kern="0" noProof="0" dirty="0" err="1" smtClean="0">
+              <a:rPr lang="en-US" kern="0" dirty="0">
                 <a:solidFill>
                   <a:sysClr val="windowText" lastClr="000000"/>
                 </a:solidFill>
                 <a:latin typeface="Calibri" pitchFamily="34" charset="0"/>
               </a:rPr>
-              <a:t>FaceValue</a:t>
-            </a:r>
-            <a:r>
-              <a:rPr lang="en-US" b="1" kern="0" noProof="0" dirty="0" smtClean="0">
+              <a:t>f</a:t>
+            </a:r>
+            <a:r>
+              <a:rPr lang="en-US" kern="0" noProof="0" dirty="0" err="1">
+                <a:solidFill>
+                  <a:sysClr val="windowText" lastClr="000000"/>
+                </a:solidFill>
+                <a:latin typeface="Calibri" pitchFamily="34" charset="0"/>
+              </a:rPr>
+              <a:t>aceValue</a:t>
+            </a:r>
+            <a:r>
+              <a:rPr lang="en-US" b="1" kern="0" noProof="0" dirty="0">
                 <a:latin typeface="Calibri" pitchFamily="34" charset="0"/>
               </a:rPr>
               <a:t>: </a:t>
             </a:r>
             <a:r>
-              <a:rPr lang="en-US" b="1" kern="0" noProof="0" dirty="0" err="1" smtClean="0">
+              <a:rPr lang="en-US" b="1" kern="0" noProof="0" dirty="0" err="1">
                 <a:solidFill>
                   <a:srgbClr val="FF0000"/>
                 </a:solidFill>
@@ -3606,7 +3579,7 @@
               <a:defRPr/>
             </a:pPr>
             <a:r>
-              <a:rPr kumimoji="0" lang="en-US" sz="1800" b="1" i="0" u="none" strike="noStrike" kern="0" cap="none" spc="0" normalizeH="0" baseline="0" noProof="0" dirty="0" smtClean="0">
+              <a:rPr kumimoji="0" lang="en-US" sz="1800" b="1" i="0" u="none" strike="noStrike" kern="0" cap="none" spc="0" normalizeH="0" baseline="0" noProof="0" dirty="0">
                 <a:ln>
                   <a:noFill/>
                 </a:ln>
@@ -3621,7 +3594,7 @@
               <a:t>&lt;&lt;enumeration&gt;&gt;</a:t>
             </a:r>
             <a:br>
-              <a:rPr kumimoji="0" lang="en-US" sz="1800" b="1" i="0" u="none" strike="noStrike" kern="0" cap="none" spc="0" normalizeH="0" baseline="0" noProof="0" dirty="0" smtClean="0">
+              <a:rPr kumimoji="0" lang="en-US" sz="1800" b="1" i="0" u="none" strike="noStrike" kern="0" cap="none" spc="0" normalizeH="0" baseline="0" noProof="0" dirty="0">
                 <a:ln>
                   <a:noFill/>
                 </a:ln>
@@ -3635,7 +3608,7 @@
               </a:rPr>
             </a:br>
             <a:r>
-              <a:rPr lang="en-US" b="1" kern="0" dirty="0" err="1" smtClean="0">
+              <a:rPr lang="en-US" b="1" kern="0" dirty="0" err="1">
                 <a:solidFill>
                   <a:srgbClr val="FF0000"/>
                 </a:solidFill>
@@ -3733,7 +3706,7 @@
               <a:defRPr/>
             </a:pPr>
             <a:r>
-              <a:rPr lang="en-US" b="1" kern="0" noProof="0" dirty="0" smtClean="0">
+              <a:rPr lang="en-US" b="1" kern="0" noProof="0" dirty="0">
                 <a:solidFill>
                   <a:srgbClr val="FF0000"/>
                 </a:solidFill>
@@ -3741,12 +3714,6 @@
               </a:rPr>
               <a:t>1</a:t>
             </a:r>
-            <a:endParaRPr lang="en-US" b="1" kern="0" noProof="0" dirty="0" smtClean="0">
-              <a:solidFill>
-                <a:srgbClr val="FF0000"/>
-              </a:solidFill>
-              <a:latin typeface="Calibri" pitchFamily="34" charset="0"/>
-            </a:endParaRPr>
           </a:p>
           <a:p>
             <a:pPr marL="171450" marR="0" lvl="0" defTabSz="914400" eaLnBrk="1" fontAlgn="auto" latinLnBrk="0" hangingPunct="1">
@@ -3767,7 +3734,7 @@
               <a:defRPr/>
             </a:pPr>
             <a:r>
-              <a:rPr lang="en-US" b="1" kern="0" noProof="0" dirty="0" smtClean="0">
+              <a:rPr lang="en-US" b="1" kern="0" noProof="0" dirty="0">
                 <a:solidFill>
                   <a:srgbClr val="FF0000"/>
                 </a:solidFill>
@@ -3775,12 +3742,6 @@
               </a:rPr>
               <a:t>2</a:t>
             </a:r>
-            <a:endParaRPr lang="en-US" b="1" kern="0" noProof="0" dirty="0" smtClean="0">
-              <a:solidFill>
-                <a:srgbClr val="FF0000"/>
-              </a:solidFill>
-              <a:latin typeface="Calibri" pitchFamily="34" charset="0"/>
-            </a:endParaRPr>
           </a:p>
           <a:p>
             <a:pPr marL="171450" marR="0" lvl="0" defTabSz="914400" eaLnBrk="1" fontAlgn="auto" latinLnBrk="0" hangingPunct="1">
@@ -3801,7 +3762,7 @@
               <a:defRPr/>
             </a:pPr>
             <a:r>
-              <a:rPr lang="en-US" b="1" kern="0" noProof="0" dirty="0" smtClean="0">
+              <a:rPr lang="en-US" b="1" kern="0" noProof="0" dirty="0">
                 <a:solidFill>
                   <a:srgbClr val="FF0000"/>
                 </a:solidFill>
@@ -3809,12 +3770,6 @@
               </a:rPr>
               <a:t>3</a:t>
             </a:r>
-            <a:endParaRPr lang="en-US" b="1" kern="0" noProof="0" dirty="0" smtClean="0">
-              <a:solidFill>
-                <a:srgbClr val="FF0000"/>
-              </a:solidFill>
-              <a:latin typeface="Calibri" pitchFamily="34" charset="0"/>
-            </a:endParaRPr>
           </a:p>
           <a:p>
             <a:pPr marL="171450" marR="0" lvl="0" defTabSz="914400" eaLnBrk="1" fontAlgn="auto" latinLnBrk="0" hangingPunct="1">
@@ -3835,7 +3790,7 @@
               <a:defRPr/>
             </a:pPr>
             <a:r>
-              <a:rPr lang="en-US" b="1" kern="0" noProof="0" dirty="0" smtClean="0">
+              <a:rPr lang="en-US" b="1" kern="0" noProof="0" dirty="0">
                 <a:solidFill>
                   <a:srgbClr val="FF0000"/>
                 </a:solidFill>
@@ -3843,12 +3798,6 @@
               </a:rPr>
               <a:t>4</a:t>
             </a:r>
-            <a:endParaRPr lang="en-US" b="1" kern="0" noProof="0" dirty="0" smtClean="0">
-              <a:solidFill>
-                <a:srgbClr val="FF0000"/>
-              </a:solidFill>
-              <a:latin typeface="Calibri" pitchFamily="34" charset="0"/>
-            </a:endParaRPr>
           </a:p>
           <a:p>
             <a:pPr marL="171450" marR="0" lvl="0" defTabSz="914400" eaLnBrk="1" fontAlgn="auto" latinLnBrk="0" hangingPunct="1">
@@ -3869,7 +3818,7 @@
               <a:defRPr/>
             </a:pPr>
             <a:r>
-              <a:rPr lang="en-US" b="1" kern="0" noProof="0" dirty="0" smtClean="0">
+              <a:rPr lang="en-US" b="1" kern="0" noProof="0" dirty="0">
                 <a:solidFill>
                   <a:srgbClr val="FF0000"/>
                 </a:solidFill>
@@ -3877,12 +3826,6 @@
               </a:rPr>
               <a:t>5</a:t>
             </a:r>
-            <a:endParaRPr lang="en-US" b="1" kern="0" noProof="0" dirty="0" smtClean="0">
-              <a:solidFill>
-                <a:srgbClr val="FF0000"/>
-              </a:solidFill>
-              <a:latin typeface="Calibri" pitchFamily="34" charset="0"/>
-            </a:endParaRPr>
           </a:p>
           <a:p>
             <a:pPr marL="171450" marR="0" lvl="0" defTabSz="914400" eaLnBrk="1" fontAlgn="auto" latinLnBrk="0" hangingPunct="1">
@@ -3903,7 +3846,7 @@
               <a:defRPr/>
             </a:pPr>
             <a:r>
-              <a:rPr lang="en-US" b="1" kern="0" noProof="0" dirty="0" smtClean="0">
+              <a:rPr lang="en-US" b="1" kern="0" noProof="0" dirty="0">
                 <a:solidFill>
                   <a:srgbClr val="FF0000"/>
                 </a:solidFill>
@@ -3984,7 +3927,7 @@
               <a:defRPr/>
             </a:pPr>
             <a:r>
-              <a:rPr kumimoji="0" lang="en-US" sz="1800" b="0" i="0" u="none" strike="noStrike" kern="0" cap="none" spc="0" normalizeH="0" baseline="0" noProof="0" dirty="0" err="1" smtClean="0">
+              <a:rPr kumimoji="0" lang="en-US" sz="1800" b="0" i="0" u="none" strike="noStrike" kern="0" cap="none" spc="0" normalizeH="0" baseline="0" noProof="0" dirty="0" err="1">
                 <a:ln>
                   <a:noFill/>
                 </a:ln>
@@ -3999,7 +3942,7 @@
               <a:t>status:</a:t>
             </a:r>
             <a:r>
-              <a:rPr kumimoji="0" lang="en-US" sz="1800" b="1" i="0" u="none" strike="noStrike" kern="0" cap="none" spc="0" normalizeH="0" baseline="0" noProof="0" dirty="0" err="1" smtClean="0">
+              <a:rPr kumimoji="0" lang="en-US" sz="1800" b="1" i="0" u="none" strike="noStrike" kern="0" cap="none" spc="0" normalizeH="0" baseline="0" noProof="0" dirty="0" err="1">
                 <a:ln>
                   <a:noFill/>
                 </a:ln>
@@ -4068,7 +4011,7 @@
               <a:defRPr/>
             </a:pPr>
             <a:r>
-              <a:rPr kumimoji="0" lang="en-US" sz="1800" b="1" i="0" u="none" strike="noStrike" kern="0" cap="none" spc="0" normalizeH="0" baseline="0" noProof="0" dirty="0" smtClean="0">
+              <a:rPr kumimoji="0" lang="en-US" sz="1800" b="1" i="0" u="none" strike="noStrike" kern="0" cap="none" spc="0" normalizeH="0" baseline="0" noProof="0" dirty="0">
                 <a:ln>
                   <a:noFill/>
                 </a:ln>
@@ -4083,7 +4026,7 @@
               <a:t>&lt;&lt;enumeration&gt;&gt;</a:t>
             </a:r>
             <a:br>
-              <a:rPr kumimoji="0" lang="en-US" sz="1800" b="1" i="0" u="none" strike="noStrike" kern="0" cap="none" spc="0" normalizeH="0" baseline="0" noProof="0" dirty="0" smtClean="0">
+              <a:rPr kumimoji="0" lang="en-US" sz="1800" b="1" i="0" u="none" strike="noStrike" kern="0" cap="none" spc="0" normalizeH="0" baseline="0" noProof="0" dirty="0">
                 <a:ln>
                   <a:noFill/>
                 </a:ln>
@@ -4097,7 +4040,7 @@
               </a:rPr>
             </a:br>
             <a:r>
-              <a:rPr lang="en-US" b="1" kern="0" dirty="0" smtClean="0">
+              <a:rPr lang="en-US" b="1" kern="0" dirty="0">
                 <a:solidFill>
                   <a:srgbClr val="FF0000"/>
                 </a:solidFill>
@@ -4174,7 +4117,7 @@
               <a:defRPr/>
             </a:pPr>
             <a:r>
-              <a:rPr lang="en-US" b="1" kern="0" noProof="0" dirty="0" smtClean="0">
+              <a:rPr lang="en-US" b="1" kern="0" noProof="0" dirty="0">
                 <a:solidFill>
                   <a:srgbClr val="FF0000"/>
                 </a:solidFill>
@@ -4202,7 +4145,7 @@
               <a:defRPr/>
             </a:pPr>
             <a:r>
-              <a:rPr kumimoji="0" lang="en-US" sz="1800" b="1" i="0" u="none" strike="noStrike" kern="0" cap="none" spc="0" normalizeH="0" baseline="0" dirty="0" smtClean="0">
+              <a:rPr kumimoji="0" lang="en-US" sz="1800" b="1" i="0" u="none" strike="noStrike" kern="0" cap="none" spc="0" normalizeH="0" baseline="0" dirty="0">
                 <a:ln>
                   <a:noFill/>
                 </a:ln>
@@ -4236,7 +4179,7 @@
               <a:defRPr/>
             </a:pPr>
             <a:r>
-              <a:rPr lang="en-US" b="1" kern="0" noProof="0" dirty="0" smtClean="0">
+              <a:rPr lang="en-US" b="1" kern="0" noProof="0" dirty="0">
                 <a:solidFill>
                   <a:srgbClr val="FF0000"/>
                 </a:solidFill>
@@ -4269,13 +4212,6 @@
   <p:clrMapOvr>
     <a:masterClrMapping/>
   </p:clrMapOvr>
-  <p:timing>
-    <p:tnLst>
-      <p:par>
-        <p:cTn id="1" dur="indefinite" restart="never" nodeType="tmRoot"/>
-      </p:par>
-    </p:tnLst>
-  </p:timing>
 </p:sld>
 </file>
 

</xml_diff>